<commit_message>
updated class diagram for UI and developer docs
</commit_message>
<xml_diff>
--- a/docs/diagrams/UiComponentClassDiagram.pptx
+++ b/docs/diagrams/UiComponentClassDiagram.pptx
@@ -5,10 +5,11 @@
     <p:sldMasterId id="2147483648" r:id="rId1"/>
   </p:sldMasterIdLst>
   <p:notesMasterIdLst>
-    <p:notesMasterId r:id="rId3"/>
+    <p:notesMasterId r:id="rId4"/>
   </p:notesMasterIdLst>
   <p:sldIdLst>
     <p:sldId id="260" r:id="rId2"/>
+    <p:sldId id="261" r:id="rId3"/>
   </p:sldIdLst>
   <p:sldSz cx="9144000" cy="6858000" type="screen4x3"/>
   <p:notesSz cx="6858000" cy="9144000"/>
@@ -208,7 +209,7 @@
           <a:p>
             <a:fld id="{F5CC4B3F-88C1-4FFA-B1B6-F41C21DC6924}" type="datetimeFigureOut">
               <a:rPr lang="en-US" smtClean="0"/>
-              <a:t>11/7/18</a:t>
+              <a:t>11/9/18</a:t>
             </a:fld>
             <a:endParaRPr lang="en-US"/>
           </a:p>
@@ -654,7 +655,7 @@
           <a:p>
             <a:fld id="{78C97017-6FC3-485B-9764-EAC9E56C1D49}" type="datetimeFigureOut">
               <a:rPr lang="en-US" smtClean="0"/>
-              <a:t>11/7/18</a:t>
+              <a:t>11/9/18</a:t>
             </a:fld>
             <a:endParaRPr lang="en-US"/>
           </a:p>
@@ -822,7 +823,7 @@
           <a:p>
             <a:fld id="{78C97017-6FC3-485B-9764-EAC9E56C1D49}" type="datetimeFigureOut">
               <a:rPr lang="en-US" smtClean="0"/>
-              <a:t>11/7/18</a:t>
+              <a:t>11/9/18</a:t>
             </a:fld>
             <a:endParaRPr lang="en-US"/>
           </a:p>
@@ -1000,7 +1001,7 @@
           <a:p>
             <a:fld id="{78C97017-6FC3-485B-9764-EAC9E56C1D49}" type="datetimeFigureOut">
               <a:rPr lang="en-US" smtClean="0"/>
-              <a:t>11/7/18</a:t>
+              <a:t>11/9/18</a:t>
             </a:fld>
             <a:endParaRPr lang="en-US"/>
           </a:p>
@@ -1168,7 +1169,7 @@
           <a:p>
             <a:fld id="{78C97017-6FC3-485B-9764-EAC9E56C1D49}" type="datetimeFigureOut">
               <a:rPr lang="en-US" smtClean="0"/>
-              <a:t>11/7/18</a:t>
+              <a:t>11/9/18</a:t>
             </a:fld>
             <a:endParaRPr lang="en-US"/>
           </a:p>
@@ -1413,7 +1414,7 @@
           <a:p>
             <a:fld id="{78C97017-6FC3-485B-9764-EAC9E56C1D49}" type="datetimeFigureOut">
               <a:rPr lang="en-US" smtClean="0"/>
-              <a:t>11/7/18</a:t>
+              <a:t>11/9/18</a:t>
             </a:fld>
             <a:endParaRPr lang="en-US"/>
           </a:p>
@@ -1698,7 +1699,7 @@
           <a:p>
             <a:fld id="{78C97017-6FC3-485B-9764-EAC9E56C1D49}" type="datetimeFigureOut">
               <a:rPr lang="en-US" smtClean="0"/>
-              <a:t>11/7/18</a:t>
+              <a:t>11/9/18</a:t>
             </a:fld>
             <a:endParaRPr lang="en-US"/>
           </a:p>
@@ -2117,7 +2118,7 @@
           <a:p>
             <a:fld id="{78C97017-6FC3-485B-9764-EAC9E56C1D49}" type="datetimeFigureOut">
               <a:rPr lang="en-US" smtClean="0"/>
-              <a:t>11/7/18</a:t>
+              <a:t>11/9/18</a:t>
             </a:fld>
             <a:endParaRPr lang="en-US"/>
           </a:p>
@@ -2234,7 +2235,7 @@
           <a:p>
             <a:fld id="{78C97017-6FC3-485B-9764-EAC9E56C1D49}" type="datetimeFigureOut">
               <a:rPr lang="en-US" smtClean="0"/>
-              <a:t>11/7/18</a:t>
+              <a:t>11/9/18</a:t>
             </a:fld>
             <a:endParaRPr lang="en-US"/>
           </a:p>
@@ -2329,7 +2330,7 @@
           <a:p>
             <a:fld id="{78C97017-6FC3-485B-9764-EAC9E56C1D49}" type="datetimeFigureOut">
               <a:rPr lang="en-US" smtClean="0"/>
-              <a:t>11/7/18</a:t>
+              <a:t>11/9/18</a:t>
             </a:fld>
             <a:endParaRPr lang="en-US"/>
           </a:p>
@@ -2604,7 +2605,7 @@
           <a:p>
             <a:fld id="{78C97017-6FC3-485B-9764-EAC9E56C1D49}" type="datetimeFigureOut">
               <a:rPr lang="en-US" smtClean="0"/>
-              <a:t>11/7/18</a:t>
+              <a:t>11/9/18</a:t>
             </a:fld>
             <a:endParaRPr lang="en-US"/>
           </a:p>
@@ -2856,7 +2857,7 @@
           <a:p>
             <a:fld id="{78C97017-6FC3-485B-9764-EAC9E56C1D49}" type="datetimeFigureOut">
               <a:rPr lang="en-US" smtClean="0"/>
-              <a:t>11/7/18</a:t>
+              <a:t>11/9/18</a:t>
             </a:fld>
             <a:endParaRPr lang="en-US"/>
           </a:p>
@@ -3067,7 +3068,7 @@
           <a:p>
             <a:fld id="{78C97017-6FC3-485B-9764-EAC9E56C1D49}" type="datetimeFigureOut">
               <a:rPr lang="en-US" smtClean="0"/>
-              <a:t>11/7/18</a:t>
+              <a:t>11/9/18</a:t>
             </a:fld>
             <a:endParaRPr lang="en-US"/>
           </a:p>
@@ -3450,8 +3451,8 @@
         </p:nvSpPr>
         <p:spPr>
           <a:xfrm>
-            <a:off x="1217465" y="1447800"/>
-            <a:ext cx="4917083" cy="3962400"/>
+            <a:off x="801330" y="1447800"/>
+            <a:ext cx="5066070" cy="4953000"/>
           </a:xfrm>
           <a:prstGeom prst="roundRect">
             <a:avLst>
@@ -3512,7 +3513,7 @@
         </p:nvSpPr>
         <p:spPr>
           <a:xfrm>
-            <a:off x="2095948" y="2341220"/>
+            <a:off x="1679813" y="2341220"/>
             <a:ext cx="1093635" cy="346760"/>
           </a:xfrm>
           <a:prstGeom prst="rect">
@@ -3545,7 +3546,7 @@
           <a:p>
             <a:pPr algn="ctr"/>
             <a:r>
-              <a:rPr lang="en-US" sz="1050" b="1" dirty="0" err="1">
+              <a:rPr lang="en-US" sz="1050" b="1" dirty="0">
                 <a:solidFill>
                   <a:schemeClr val="accent3">
                     <a:lumMod val="75000"/>
@@ -3572,7 +3573,7 @@
         </p:nvSpPr>
         <p:spPr>
           <a:xfrm>
-            <a:off x="2592528" y="2971800"/>
+            <a:off x="2176393" y="2971800"/>
             <a:ext cx="1093635" cy="236841"/>
           </a:xfrm>
           <a:prstGeom prst="rect">
@@ -3605,7 +3606,7 @@
           <a:p>
             <a:pPr algn="ctr"/>
             <a:r>
-              <a:rPr lang="en-US" sz="1050" b="1" dirty="0" err="1">
+              <a:rPr lang="en-US" sz="1050" b="1" dirty="0">
                 <a:solidFill>
                   <a:schemeClr val="accent3">
                     <a:lumMod val="75000"/>
@@ -3632,7 +3633,7 @@
         </p:nvSpPr>
         <p:spPr>
           <a:xfrm>
-            <a:off x="2092842" y="1770924"/>
+            <a:off x="1676707" y="1770924"/>
             <a:ext cx="1093635" cy="346760"/>
           </a:xfrm>
           <a:prstGeom prst="rect">
@@ -3668,7 +3669,7 @@
           <a:p>
             <a:pPr algn="ctr"/>
             <a:r>
-              <a:rPr lang="en-US" sz="1050" dirty="0" err="1">
+              <a:rPr lang="en-US" sz="1050" dirty="0">
                 <a:solidFill>
                   <a:schemeClr val="bg1"/>
                 </a:solidFill>
@@ -3694,7 +3695,7 @@
         </p:nvCxnSpPr>
         <p:spPr>
           <a:xfrm rot="16200000" flipH="1">
-            <a:off x="2529445" y="2227899"/>
+            <a:off x="2113310" y="2227899"/>
             <a:ext cx="223536" cy="3106"/>
           </a:xfrm>
           <a:prstGeom prst="bentConnector3">
@@ -3734,7 +3735,7 @@
         </p:nvSpPr>
         <p:spPr>
           <a:xfrm rot="10800000" flipV="1">
-            <a:off x="5392058" y="2153674"/>
+            <a:off x="4975923" y="2153674"/>
             <a:ext cx="270504" cy="175523"/>
           </a:xfrm>
           <a:prstGeom prst="triangle">
@@ -3784,7 +3785,7 @@
         </p:nvCxnSpPr>
         <p:spPr>
           <a:xfrm flipV="1">
-            <a:off x="644735" y="2991937"/>
+            <a:off x="228600" y="2991937"/>
             <a:ext cx="684904" cy="1"/>
           </a:xfrm>
           <a:prstGeom prst="bentConnector3">
@@ -3827,7 +3828,7 @@
         </p:nvSpPr>
         <p:spPr>
           <a:xfrm rot="16200000">
-            <a:off x="5703829" y="2464877"/>
+            <a:off x="5414195" y="2464878"/>
             <a:ext cx="2362201" cy="328045"/>
           </a:xfrm>
           <a:prstGeom prst="roundRect">
@@ -3887,7 +3888,7 @@
         </p:nvSpPr>
         <p:spPr>
           <a:xfrm>
-            <a:off x="2592528" y="3649359"/>
+            <a:off x="2176393" y="3649359"/>
             <a:ext cx="1093635" cy="236841"/>
           </a:xfrm>
           <a:prstGeom prst="rect">
@@ -3920,7 +3921,7 @@
           <a:p>
             <a:pPr algn="ctr"/>
             <a:r>
-              <a:rPr lang="en-US" sz="1050" b="1" dirty="0" err="1" smtClean="0">
+              <a:rPr lang="en-US" sz="1050" b="1" dirty="0" smtClean="0">
                 <a:solidFill>
                   <a:schemeClr val="accent3">
                     <a:lumMod val="75000"/>
@@ -3947,7 +3948,7 @@
         </p:nvSpPr>
         <p:spPr>
           <a:xfrm>
-            <a:off x="2590799" y="5504816"/>
+            <a:off x="2174664" y="5504816"/>
             <a:ext cx="1093635" cy="236841"/>
           </a:xfrm>
           <a:prstGeom prst="rect">
@@ -3980,7 +3981,7 @@
           <a:p>
             <a:pPr algn="ctr"/>
             <a:r>
-              <a:rPr lang="en-US" sz="1050" b="1" dirty="0" err="1">
+              <a:rPr lang="en-US" sz="1050" b="1" dirty="0">
                 <a:solidFill>
                   <a:schemeClr val="accent3">
                     <a:lumMod val="75000"/>
@@ -4007,7 +4008,7 @@
         </p:nvSpPr>
         <p:spPr>
           <a:xfrm>
-            <a:off x="2569200" y="4895682"/>
+            <a:off x="2153065" y="4895682"/>
             <a:ext cx="1093635" cy="236841"/>
           </a:xfrm>
           <a:prstGeom prst="rect">
@@ -4040,7 +4041,7 @@
           <a:p>
             <a:pPr algn="ctr"/>
             <a:r>
-              <a:rPr lang="en-US" sz="1050" b="1" dirty="0" err="1" smtClean="0">
+              <a:rPr lang="en-US" sz="1050" b="1" dirty="0" smtClean="0">
                 <a:solidFill>
                   <a:schemeClr val="accent3">
                     <a:lumMod val="75000"/>
@@ -4067,7 +4068,7 @@
         </p:nvSpPr>
         <p:spPr>
           <a:xfrm>
-            <a:off x="3886200" y="5182419"/>
+            <a:off x="3470065" y="5182419"/>
             <a:ext cx="1040906" cy="236841"/>
           </a:xfrm>
           <a:prstGeom prst="rect">
@@ -4100,7 +4101,7 @@
           <a:p>
             <a:pPr algn="ctr"/>
             <a:r>
-              <a:rPr lang="en-US" sz="1050" b="1" dirty="0" err="1" smtClean="0">
+              <a:rPr lang="en-US" sz="1050" b="1" dirty="0" smtClean="0">
                 <a:solidFill>
                   <a:schemeClr val="accent3">
                     <a:lumMod val="75000"/>
@@ -4127,7 +4128,7 @@
         </p:nvSpPr>
         <p:spPr>
           <a:xfrm>
-            <a:off x="2608742" y="5953001"/>
+            <a:off x="2192607" y="5953001"/>
             <a:ext cx="1093635" cy="236841"/>
           </a:xfrm>
           <a:prstGeom prst="rect">
@@ -4160,7 +4161,7 @@
           <a:p>
             <a:pPr algn="ctr"/>
             <a:r>
-              <a:rPr lang="en-US" sz="1050" b="1" dirty="0" err="1">
+              <a:rPr lang="en-US" sz="1050" b="1" dirty="0">
                 <a:solidFill>
                   <a:schemeClr val="accent3">
                     <a:lumMod val="75000"/>
@@ -4187,7 +4188,7 @@
         </p:nvSpPr>
         <p:spPr>
           <a:xfrm>
-            <a:off x="2324548" y="2706452"/>
+            <a:off x="1908413" y="2706452"/>
             <a:ext cx="183156" cy="161573"/>
           </a:xfrm>
           <a:prstGeom prst="flowChartDecision">
@@ -4238,7 +4239,7 @@
         </p:nvCxnSpPr>
         <p:spPr>
           <a:xfrm rot="16200000" flipH="1">
-            <a:off x="2393229" y="2890922"/>
+            <a:off x="1977094" y="2890922"/>
             <a:ext cx="222196" cy="176402"/>
           </a:xfrm>
           <a:prstGeom prst="bentConnector2">
@@ -4276,7 +4277,7 @@
         </p:nvSpPr>
         <p:spPr>
           <a:xfrm>
-            <a:off x="2590799" y="3304308"/>
+            <a:off x="2174664" y="3304308"/>
             <a:ext cx="1095361" cy="236841"/>
           </a:xfrm>
           <a:prstGeom prst="rect">
@@ -4309,7 +4310,7 @@
           <a:p>
             <a:pPr algn="ctr"/>
             <a:r>
-              <a:rPr lang="en-US" sz="1050" b="1" dirty="0" err="1">
+              <a:rPr lang="en-US" sz="1050" b="1" dirty="0">
                 <a:solidFill>
                   <a:schemeClr val="accent3">
                     <a:lumMod val="75000"/>
@@ -4339,7 +4340,7 @@
         </p:nvCxnSpPr>
         <p:spPr>
           <a:xfrm rot="16200000" flipH="1">
-            <a:off x="2054450" y="3229701"/>
+            <a:off x="1638315" y="3229701"/>
             <a:ext cx="899755" cy="176402"/>
           </a:xfrm>
           <a:prstGeom prst="bentConnector2">
@@ -4380,7 +4381,7 @@
         </p:nvCxnSpPr>
         <p:spPr>
           <a:xfrm rot="16200000" flipH="1">
-            <a:off x="1419624" y="3864527"/>
+            <a:off x="1003489" y="3864527"/>
             <a:ext cx="2146078" cy="153074"/>
           </a:xfrm>
           <a:prstGeom prst="bentConnector2">
@@ -4421,7 +4422,7 @@
         </p:nvCxnSpPr>
         <p:spPr>
           <a:xfrm rot="16200000" flipH="1">
-            <a:off x="1125856" y="4158294"/>
+            <a:off x="709721" y="4158294"/>
             <a:ext cx="2755212" cy="174673"/>
           </a:xfrm>
           <a:prstGeom prst="bentConnector2">
@@ -4461,7 +4462,7 @@
         </p:nvCxnSpPr>
         <p:spPr>
           <a:xfrm rot="16200000" flipH="1">
-            <a:off x="699445" y="4162124"/>
+            <a:off x="283310" y="4162124"/>
             <a:ext cx="3364969" cy="453625"/>
           </a:xfrm>
           <a:prstGeom prst="bentConnector2">
@@ -4499,7 +4500,7 @@
         </p:nvSpPr>
         <p:spPr>
           <a:xfrm>
-            <a:off x="5143947" y="1813163"/>
+            <a:off x="4727812" y="1813163"/>
             <a:ext cx="772043" cy="346760"/>
           </a:xfrm>
           <a:prstGeom prst="rect">
@@ -4551,7 +4552,7 @@
               </a:rPr>
             </a:br>
             <a:r>
-              <a:rPr lang="en-US" sz="1050" b="1" dirty="0" err="1">
+              <a:rPr lang="en-US" sz="1050" b="1" dirty="0">
                 <a:solidFill>
                   <a:schemeClr val="accent3">
                     <a:lumMod val="75000"/>
@@ -4581,7 +4582,7 @@
         </p:nvCxnSpPr>
         <p:spPr>
           <a:xfrm flipV="1">
-            <a:off x="3686160" y="2329197"/>
+            <a:off x="3270025" y="2329197"/>
             <a:ext cx="1834006" cy="1093532"/>
           </a:xfrm>
           <a:prstGeom prst="bentConnector2">
@@ -4622,7 +4623,7 @@
         </p:nvCxnSpPr>
         <p:spPr>
           <a:xfrm rot="5400000">
-            <a:off x="3737815" y="3518488"/>
+            <a:off x="3321680" y="3518488"/>
             <a:ext cx="2971643" cy="593060"/>
           </a:xfrm>
           <a:prstGeom prst="bentConnector2">
@@ -4663,7 +4664,7 @@
         </p:nvCxnSpPr>
         <p:spPr>
           <a:xfrm rot="5400000">
-            <a:off x="3883874" y="2131487"/>
+            <a:off x="3467739" y="2131487"/>
             <a:ext cx="1438583" cy="1834003"/>
           </a:xfrm>
           <a:prstGeom prst="bentConnector2">
@@ -4704,7 +4705,7 @@
         </p:nvCxnSpPr>
         <p:spPr>
           <a:xfrm flipV="1">
-            <a:off x="3189583" y="2329197"/>
+            <a:off x="2773448" y="2329197"/>
             <a:ext cx="2330583" cy="185403"/>
           </a:xfrm>
           <a:prstGeom prst="bentConnector2">
@@ -4745,7 +4746,7 @@
         </p:nvCxnSpPr>
         <p:spPr>
           <a:xfrm rot="5400000">
-            <a:off x="2955280" y="3058351"/>
+            <a:off x="2539145" y="3058351"/>
             <a:ext cx="3294040" cy="1835732"/>
           </a:xfrm>
           <a:prstGeom prst="bentConnector2">
@@ -4786,7 +4787,7 @@
         </p:nvCxnSpPr>
         <p:spPr>
           <a:xfrm rot="5400000">
-            <a:off x="2740160" y="3291415"/>
+            <a:off x="2324025" y="3291415"/>
             <a:ext cx="3742225" cy="1817789"/>
           </a:xfrm>
           <a:prstGeom prst="bentConnector2">
@@ -4826,7 +4827,7 @@
         </p:nvCxnSpPr>
         <p:spPr>
           <a:xfrm rot="5400000" flipH="1" flipV="1">
-            <a:off x="4594921" y="-355061"/>
+            <a:off x="4178786" y="-355061"/>
             <a:ext cx="170724" cy="4081246"/>
           </a:xfrm>
           <a:prstGeom prst="bentConnector2">
@@ -4865,7 +4866,7 @@
         </p:nvSpPr>
         <p:spPr>
           <a:xfrm rot="16200000">
-            <a:off x="6090232" y="4531485"/>
+            <a:off x="5800598" y="4531486"/>
             <a:ext cx="1618616" cy="328045"/>
           </a:xfrm>
           <a:prstGeom prst="roundRect">
@@ -4925,7 +4926,7 @@
         </p:nvSpPr>
         <p:spPr>
           <a:xfrm rot="16200000">
-            <a:off x="956202" y="2861202"/>
+            <a:off x="540067" y="2861202"/>
             <a:ext cx="1093635" cy="346760"/>
           </a:xfrm>
           <a:prstGeom prst="rect">
@@ -4972,7 +4973,7 @@
           <a:p>
             <a:pPr algn="ctr"/>
             <a:r>
-              <a:rPr lang="en-US" sz="1050" dirty="0" err="1">
+              <a:rPr lang="en-US" sz="1050" dirty="0">
                 <a:solidFill>
                   <a:schemeClr val="bg1"/>
                 </a:solidFill>
@@ -4995,7 +4996,7 @@
         </p:nvSpPr>
         <p:spPr>
           <a:xfrm flipV="1">
-            <a:off x="1367767" y="2286001"/>
+            <a:off x="951632" y="2286001"/>
             <a:ext cx="270504" cy="175523"/>
           </a:xfrm>
           <a:prstGeom prst="triangle">
@@ -5046,7 +5047,7 @@
         </p:nvCxnSpPr>
         <p:spPr>
           <a:xfrm rot="10800000" flipV="1">
-            <a:off x="1503020" y="1944303"/>
+            <a:off x="1086885" y="1944303"/>
             <a:ext cx="589823" cy="341697"/>
           </a:xfrm>
           <a:prstGeom prst="bentConnector2">
@@ -5088,7 +5089,7 @@
         </p:nvCxnSpPr>
         <p:spPr>
           <a:xfrm rot="16200000" flipH="1">
-            <a:off x="2226110" y="3058040"/>
+            <a:off x="1809975" y="3058040"/>
             <a:ext cx="554704" cy="174673"/>
           </a:xfrm>
           <a:prstGeom prst="bentConnector2">
@@ -5129,7 +5130,7 @@
         </p:nvCxnSpPr>
         <p:spPr>
           <a:xfrm rot="5400000">
-            <a:off x="4222653" y="1792708"/>
+            <a:off x="3806518" y="1792708"/>
             <a:ext cx="761024" cy="1834003"/>
           </a:xfrm>
           <a:prstGeom prst="bentConnector2">
@@ -5170,7 +5171,7 @@
         </p:nvCxnSpPr>
         <p:spPr>
           <a:xfrm rot="16200000" flipH="1">
-            <a:off x="3416951" y="4831590"/>
+            <a:off x="3000816" y="4831590"/>
             <a:ext cx="168317" cy="770182"/>
           </a:xfrm>
           <a:prstGeom prst="bentConnector2">
@@ -5211,7 +5212,7 @@
         </p:nvCxnSpPr>
         <p:spPr>
           <a:xfrm rot="5400000">
-            <a:off x="3249048" y="2742985"/>
+            <a:off x="2832913" y="2742985"/>
             <a:ext cx="2684906" cy="1857331"/>
           </a:xfrm>
           <a:prstGeom prst="bentConnector2">
@@ -5249,7 +5250,7 @@
         </p:nvSpPr>
         <p:spPr>
           <a:xfrm>
-            <a:off x="5435896" y="2743200"/>
+            <a:off x="5019761" y="2743200"/>
             <a:ext cx="229325" cy="166560"/>
           </a:xfrm>
           <a:prstGeom prst="rect">
@@ -5302,7 +5303,7 @@
         </p:nvSpPr>
         <p:spPr>
           <a:xfrm>
-            <a:off x="3687515" y="2828802"/>
+            <a:off x="3271380" y="2828802"/>
             <a:ext cx="3048000" cy="203200"/>
           </a:xfrm>
           <a:custGeom>
@@ -5384,7 +5385,7 @@
         </p:nvSpPr>
         <p:spPr>
           <a:xfrm>
-            <a:off x="5431573" y="4488138"/>
+            <a:off x="5015438" y="4488138"/>
             <a:ext cx="229325" cy="160062"/>
           </a:xfrm>
           <a:prstGeom prst="rect">
@@ -5437,7 +5438,7 @@
         </p:nvSpPr>
         <p:spPr>
           <a:xfrm>
-            <a:off x="4909505" y="4032731"/>
+            <a:off x="4493370" y="4032731"/>
             <a:ext cx="1820144" cy="45719"/>
           </a:xfrm>
           <a:custGeom>
@@ -5519,7 +5520,7 @@
         </p:nvSpPr>
         <p:spPr>
           <a:xfrm>
-            <a:off x="3851000" y="4089880"/>
+            <a:off x="3434865" y="4089880"/>
             <a:ext cx="1040906" cy="236841"/>
           </a:xfrm>
           <a:prstGeom prst="rect">
@@ -5552,7 +5553,7 @@
           <a:p>
             <a:pPr algn="ctr"/>
             <a:r>
-              <a:rPr lang="en-US" sz="1050" b="1" dirty="0" err="1" smtClean="0">
+              <a:rPr lang="en-US" sz="1050" b="1" dirty="0" smtClean="0">
                 <a:solidFill>
                   <a:schemeClr val="accent3">
                     <a:lumMod val="75000"/>
@@ -5582,7 +5583,7 @@
         </p:nvCxnSpPr>
         <p:spPr>
           <a:xfrm rot="5400000" flipH="1" flipV="1">
-            <a:off x="3139819" y="4184501"/>
+            <a:off x="2723684" y="4184501"/>
             <a:ext cx="687381" cy="734982"/>
           </a:xfrm>
           <a:prstGeom prst="bentConnector2">
@@ -5620,7 +5621,7 @@
         </p:nvSpPr>
         <p:spPr>
           <a:xfrm>
-            <a:off x="3823484" y="4538911"/>
+            <a:off x="3407349" y="4538911"/>
             <a:ext cx="1040906" cy="236841"/>
           </a:xfrm>
           <a:prstGeom prst="rect">
@@ -5653,24 +5654,14 @@
           <a:p>
             <a:pPr algn="ctr"/>
             <a:r>
-              <a:rPr lang="en-US" sz="1050" b="1" dirty="0" err="1" smtClean="0">
+              <a:rPr lang="en-US" sz="1050" b="1" dirty="0" smtClean="0">
                 <a:solidFill>
                   <a:schemeClr val="accent3">
                     <a:lumMod val="75000"/>
                   </a:schemeClr>
                 </a:solidFill>
               </a:rPr>
-              <a:t>Test</a:t>
-            </a:r>
-            <a:r>
-              <a:rPr lang="en-US" sz="1050" b="1" dirty="0" err="1" smtClean="0">
-                <a:solidFill>
-                  <a:schemeClr val="accent3">
-                    <a:lumMod val="75000"/>
-                  </a:schemeClr>
-                </a:solidFill>
-              </a:rPr>
-              <a:t>Page</a:t>
+              <a:t>TestPage</a:t>
             </a:r>
             <a:endParaRPr lang="en-SG" sz="1050" b="1" dirty="0">
               <a:solidFill>
@@ -5692,7 +5683,7 @@
         </p:nvCxnSpPr>
         <p:spPr>
           <a:xfrm rot="5400000">
-            <a:off x="4016351" y="3192178"/>
+            <a:off x="3600216" y="3192178"/>
             <a:ext cx="2366796" cy="640835"/>
           </a:xfrm>
           <a:prstGeom prst="bentConnector3">
@@ -5735,7 +5726,7 @@
         </p:nvCxnSpPr>
         <p:spPr>
           <a:xfrm rot="5400000">
-            <a:off x="4266484" y="2954619"/>
+            <a:off x="3850349" y="2954619"/>
             <a:ext cx="1879104" cy="628260"/>
           </a:xfrm>
           <a:prstGeom prst="bentConnector2">
@@ -5776,7 +5767,7 @@
         </p:nvCxnSpPr>
         <p:spPr>
           <a:xfrm rot="5400000" flipH="1" flipV="1">
-            <a:off x="3350576" y="4422774"/>
+            <a:off x="2934441" y="4422774"/>
             <a:ext cx="238350" cy="707466"/>
           </a:xfrm>
           <a:prstGeom prst="bentConnector2">
@@ -5814,7 +5805,7 @@
         </p:nvSpPr>
         <p:spPr>
           <a:xfrm>
-            <a:off x="4872956" y="4415900"/>
+            <a:off x="4456821" y="4415900"/>
             <a:ext cx="1856693" cy="110650"/>
           </a:xfrm>
           <a:custGeom>
@@ -5896,7 +5887,7 @@
         </p:nvSpPr>
         <p:spPr>
           <a:xfrm>
-            <a:off x="4940088" y="5085963"/>
+            <a:off x="4523953" y="5085963"/>
             <a:ext cx="1789561" cy="88707"/>
           </a:xfrm>
           <a:custGeom>
@@ -5974,6 +5965,966 @@
     <p:extLst>
       <p:ext uri="{BB962C8B-B14F-4D97-AF65-F5344CB8AC3E}">
         <p14:creationId xmlns:p14="http://schemas.microsoft.com/office/powerpoint/2010/main" val="2776882492"/>
+      </p:ext>
+    </p:extLst>
+  </p:cSld>
+  <p:clrMapOvr>
+    <a:masterClrMapping/>
+  </p:clrMapOvr>
+</p:sld>
+</file>
+
+<file path=ppt/slides/slide2.xml><?xml version="1.0" encoding="utf-8"?>
+<p:sld xmlns:a="http://schemas.openxmlformats.org/drawingml/2006/main" xmlns:r="http://schemas.openxmlformats.org/officeDocument/2006/relationships" xmlns:p="http://schemas.openxmlformats.org/presentationml/2006/main">
+  <p:cSld>
+    <p:spTree>
+      <p:nvGrpSpPr>
+        <p:cNvPr id="1" name=""/>
+        <p:cNvGrpSpPr/>
+        <p:nvPr/>
+      </p:nvGrpSpPr>
+      <p:grpSpPr>
+        <a:xfrm>
+          <a:off x="0" y="0"/>
+          <a:ext cx="0" cy="0"/>
+          <a:chOff x="0" y="0"/>
+          <a:chExt cx="0" cy="0"/>
+        </a:xfrm>
+      </p:grpSpPr>
+      <p:sp>
+        <p:nvSpPr>
+          <p:cNvPr id="50" name="Rectangle 11"/>
+          <p:cNvSpPr/>
+          <p:nvPr/>
+        </p:nvSpPr>
+        <p:spPr>
+          <a:xfrm>
+            <a:off x="1487263" y="2267465"/>
+            <a:ext cx="967417" cy="411790"/>
+          </a:xfrm>
+          <a:prstGeom prst="rect">
+            <a:avLst/>
+          </a:prstGeom>
+          <a:ln w="19050">
+            <a:solidFill>
+              <a:schemeClr val="accent3"/>
+            </a:solidFill>
+          </a:ln>
+          <a:effectLst/>
+        </p:spPr>
+        <p:style>
+          <a:lnRef idx="1">
+            <a:schemeClr val="accent3"/>
+          </a:lnRef>
+          <a:fillRef idx="2">
+            <a:schemeClr val="accent3"/>
+          </a:fillRef>
+          <a:effectRef idx="1">
+            <a:schemeClr val="accent3"/>
+          </a:effectRef>
+          <a:fontRef idx="minor">
+            <a:schemeClr val="dk1"/>
+          </a:fontRef>
+        </p:style>
+        <p:txBody>
+          <a:bodyPr rtlCol="0" anchor="ctr"/>
+          <a:lstStyle/>
+          <a:p>
+            <a:pPr algn="ctr"/>
+            <a:r>
+              <a:rPr lang="en-US" sz="1100" b="1" dirty="0" smtClean="0">
+                <a:solidFill>
+                  <a:schemeClr val="accent3">
+                    <a:lumMod val="75000"/>
+                  </a:schemeClr>
+                </a:solidFill>
+              </a:rPr>
+              <a:t>TestPage</a:t>
+            </a:r>
+            <a:endParaRPr lang="en-SG" sz="1100" b="1" dirty="0">
+              <a:solidFill>
+                <a:schemeClr val="accent3">
+                  <a:lumMod val="75000"/>
+                </a:schemeClr>
+              </a:solidFill>
+            </a:endParaRPr>
+          </a:p>
+        </p:txBody>
+      </p:sp>
+      <p:sp>
+        <p:nvSpPr>
+          <p:cNvPr id="51" name="Flowchart: Decision 38"/>
+          <p:cNvSpPr/>
+          <p:nvPr/>
+        </p:nvSpPr>
+        <p:spPr>
+          <a:xfrm>
+            <a:off x="1879395" y="2701787"/>
+            <a:ext cx="183156" cy="161573"/>
+          </a:xfrm>
+          <a:prstGeom prst="flowChartDecision">
+            <a:avLst/>
+          </a:prstGeom>
+          <a:solidFill>
+            <a:schemeClr val="accent3"/>
+          </a:solidFill>
+          <a:ln>
+            <a:solidFill>
+              <a:schemeClr val="accent3"/>
+            </a:solidFill>
+          </a:ln>
+        </p:spPr>
+        <p:style>
+          <a:lnRef idx="2">
+            <a:schemeClr val="accent1">
+              <a:shade val="50000"/>
+            </a:schemeClr>
+          </a:lnRef>
+          <a:fillRef idx="1">
+            <a:schemeClr val="accent1"/>
+          </a:fillRef>
+          <a:effectRef idx="0">
+            <a:schemeClr val="accent1"/>
+          </a:effectRef>
+          <a:fontRef idx="minor">
+            <a:schemeClr val="lt1"/>
+          </a:fontRef>
+        </p:style>
+        <p:txBody>
+          <a:bodyPr rtlCol="0" anchor="ctr"/>
+          <a:lstStyle/>
+          <a:p>
+            <a:pPr algn="ctr"/>
+            <a:endParaRPr lang="en-SG" sz="1100"/>
+          </a:p>
+        </p:txBody>
+      </p:sp>
+      <p:cxnSp>
+        <p:nvCxnSpPr>
+          <p:cNvPr id="52" name="Elbow Connector 51"/>
+          <p:cNvCxnSpPr>
+            <a:stCxn id="51" idx="2"/>
+            <a:endCxn id="53" idx="1"/>
+          </p:cNvCxnSpPr>
+          <p:nvPr/>
+        </p:nvCxnSpPr>
+        <p:spPr>
+          <a:xfrm rot="16200000" flipH="1">
+            <a:off x="1602423" y="3231910"/>
+            <a:ext cx="942520" cy="205420"/>
+          </a:xfrm>
+          <a:prstGeom prst="bentConnector2">
+            <a:avLst/>
+          </a:prstGeom>
+          <a:ln w="19050">
+            <a:solidFill>
+              <a:schemeClr val="accent3"/>
+            </a:solidFill>
+            <a:headEnd type="none" w="med" len="med"/>
+            <a:tailEnd type="arrow" w="med" len="med"/>
+          </a:ln>
+          <a:effectLst/>
+        </p:spPr>
+        <p:style>
+          <a:lnRef idx="1">
+            <a:schemeClr val="accent2"/>
+          </a:lnRef>
+          <a:fillRef idx="2">
+            <a:schemeClr val="accent2"/>
+          </a:fillRef>
+          <a:effectRef idx="1">
+            <a:schemeClr val="accent2"/>
+          </a:effectRef>
+          <a:fontRef idx="minor">
+            <a:schemeClr val="dk1"/>
+          </a:fontRef>
+        </p:style>
+      </p:cxnSp>
+      <p:sp>
+        <p:nvSpPr>
+          <p:cNvPr id="53" name="Rectangle 11"/>
+          <p:cNvSpPr/>
+          <p:nvPr/>
+        </p:nvSpPr>
+        <p:spPr>
+          <a:xfrm>
+            <a:off x="2176393" y="3649359"/>
+            <a:ext cx="1786007" cy="313041"/>
+          </a:xfrm>
+          <a:prstGeom prst="rect">
+            <a:avLst/>
+          </a:prstGeom>
+          <a:ln w="19050">
+            <a:solidFill>
+              <a:schemeClr val="accent3"/>
+            </a:solidFill>
+          </a:ln>
+          <a:effectLst/>
+        </p:spPr>
+        <p:style>
+          <a:lnRef idx="1">
+            <a:schemeClr val="accent3"/>
+          </a:lnRef>
+          <a:fillRef idx="2">
+            <a:schemeClr val="accent3"/>
+          </a:fillRef>
+          <a:effectRef idx="1">
+            <a:schemeClr val="accent3"/>
+          </a:effectRef>
+          <a:fontRef idx="minor">
+            <a:schemeClr val="dk1"/>
+          </a:fontRef>
+        </p:style>
+        <p:txBody>
+          <a:bodyPr rtlCol="0" anchor="ctr"/>
+          <a:lstStyle/>
+          <a:p>
+            <a:pPr algn="ctr"/>
+            <a:r>
+              <a:rPr lang="en-US" sz="1100" b="1" dirty="0" smtClean="0">
+                <a:solidFill>
+                  <a:schemeClr val="accent3">
+                    <a:lumMod val="75000"/>
+                  </a:schemeClr>
+                </a:solidFill>
+              </a:rPr>
+              <a:t>OpenEndedResult</a:t>
+            </a:r>
+            <a:r>
+              <a:rPr lang="en-US" sz="1100" b="1" dirty="0" smtClean="0">
+                <a:solidFill>
+                  <a:schemeClr val="accent3">
+                    <a:lumMod val="75000"/>
+                  </a:schemeClr>
+                </a:solidFill>
+              </a:rPr>
+              <a:t>Page</a:t>
+            </a:r>
+            <a:endParaRPr lang="en-SG" sz="1100" b="1" dirty="0">
+              <a:solidFill>
+                <a:schemeClr val="accent3">
+                  <a:lumMod val="75000"/>
+                </a:schemeClr>
+              </a:solidFill>
+            </a:endParaRPr>
+          </a:p>
+        </p:txBody>
+      </p:sp>
+      <p:sp>
+        <p:nvSpPr>
+          <p:cNvPr id="56" name="Rectangle 11"/>
+          <p:cNvSpPr/>
+          <p:nvPr/>
+        </p:nvSpPr>
+        <p:spPr>
+          <a:xfrm>
+            <a:off x="2176392" y="4132298"/>
+            <a:ext cx="1786008" cy="355261"/>
+          </a:xfrm>
+          <a:prstGeom prst="rect">
+            <a:avLst/>
+          </a:prstGeom>
+          <a:ln w="19050">
+            <a:solidFill>
+              <a:schemeClr val="accent3"/>
+            </a:solidFill>
+          </a:ln>
+          <a:effectLst/>
+        </p:spPr>
+        <p:style>
+          <a:lnRef idx="1">
+            <a:schemeClr val="accent3"/>
+          </a:lnRef>
+          <a:fillRef idx="2">
+            <a:schemeClr val="accent3"/>
+          </a:fillRef>
+          <a:effectRef idx="1">
+            <a:schemeClr val="accent3"/>
+          </a:effectRef>
+          <a:fontRef idx="minor">
+            <a:schemeClr val="dk1"/>
+          </a:fontRef>
+        </p:style>
+        <p:txBody>
+          <a:bodyPr rtlCol="0" anchor="ctr"/>
+          <a:lstStyle/>
+          <a:p>
+            <a:pPr algn="ctr"/>
+            <a:r>
+              <a:rPr lang="en-US" sz="1100" b="1" smtClean="0">
+                <a:solidFill>
+                  <a:schemeClr val="accent3">
+                    <a:lumMod val="75000"/>
+                  </a:schemeClr>
+                </a:solidFill>
+              </a:rPr>
+              <a:t>MatchTestResultPage</a:t>
+            </a:r>
+            <a:endParaRPr lang="en-SG" sz="1100" b="1" dirty="0">
+              <a:solidFill>
+                <a:schemeClr val="accent3">
+                  <a:lumMod val="75000"/>
+                </a:schemeClr>
+              </a:solidFill>
+            </a:endParaRPr>
+          </a:p>
+        </p:txBody>
+      </p:sp>
+      <p:sp>
+        <p:nvSpPr>
+          <p:cNvPr id="58" name="Rectangle 11"/>
+          <p:cNvSpPr/>
+          <p:nvPr/>
+        </p:nvSpPr>
+        <p:spPr>
+          <a:xfrm>
+            <a:off x="2176391" y="5562600"/>
+            <a:ext cx="1786008" cy="355261"/>
+          </a:xfrm>
+          <a:prstGeom prst="rect">
+            <a:avLst/>
+          </a:prstGeom>
+          <a:ln w="19050">
+            <a:solidFill>
+              <a:schemeClr val="accent3"/>
+            </a:solidFill>
+          </a:ln>
+          <a:effectLst/>
+        </p:spPr>
+        <p:style>
+          <a:lnRef idx="1">
+            <a:schemeClr val="accent3"/>
+          </a:lnRef>
+          <a:fillRef idx="2">
+            <a:schemeClr val="accent3"/>
+          </a:fillRef>
+          <a:effectRef idx="1">
+            <a:schemeClr val="accent3"/>
+          </a:effectRef>
+          <a:fontRef idx="minor">
+            <a:schemeClr val="dk1"/>
+          </a:fontRef>
+        </p:style>
+        <p:txBody>
+          <a:bodyPr rtlCol="0" anchor="ctr"/>
+          <a:lstStyle/>
+          <a:p>
+            <a:pPr algn="ctr"/>
+            <a:r>
+              <a:rPr lang="en-US" sz="1100" b="1" dirty="0" smtClean="0">
+                <a:solidFill>
+                  <a:schemeClr val="accent3">
+                    <a:lumMod val="75000"/>
+                  </a:schemeClr>
+                </a:solidFill>
+              </a:rPr>
+              <a:t>OpenEndedTestPage</a:t>
+            </a:r>
+            <a:endParaRPr lang="en-SG" sz="1100" b="1" dirty="0">
+              <a:solidFill>
+                <a:schemeClr val="accent3">
+                  <a:lumMod val="75000"/>
+                </a:schemeClr>
+              </a:solidFill>
+            </a:endParaRPr>
+          </a:p>
+        </p:txBody>
+      </p:sp>
+      <p:sp>
+        <p:nvSpPr>
+          <p:cNvPr id="60" name="Rectangle 11"/>
+          <p:cNvSpPr/>
+          <p:nvPr/>
+        </p:nvSpPr>
+        <p:spPr>
+          <a:xfrm>
+            <a:off x="2176392" y="4868559"/>
+            <a:ext cx="1786007" cy="313041"/>
+          </a:xfrm>
+          <a:prstGeom prst="rect">
+            <a:avLst/>
+          </a:prstGeom>
+          <a:ln w="19050">
+            <a:solidFill>
+              <a:schemeClr val="accent3"/>
+            </a:solidFill>
+          </a:ln>
+          <a:effectLst/>
+        </p:spPr>
+        <p:style>
+          <a:lnRef idx="1">
+            <a:schemeClr val="accent3"/>
+          </a:lnRef>
+          <a:fillRef idx="2">
+            <a:schemeClr val="accent3"/>
+          </a:fillRef>
+          <a:effectRef idx="1">
+            <a:schemeClr val="accent3"/>
+          </a:effectRef>
+          <a:fontRef idx="minor">
+            <a:schemeClr val="dk1"/>
+          </a:fontRef>
+        </p:style>
+        <p:txBody>
+          <a:bodyPr rtlCol="0" anchor="ctr"/>
+          <a:lstStyle/>
+          <a:p>
+            <a:pPr algn="ctr"/>
+            <a:r>
+              <a:rPr lang="en-US" sz="1100" b="1" dirty="0" smtClean="0">
+                <a:solidFill>
+                  <a:schemeClr val="accent3">
+                    <a:lumMod val="75000"/>
+                  </a:schemeClr>
+                </a:solidFill>
+              </a:rPr>
+              <a:t>MatchTestPage</a:t>
+            </a:r>
+            <a:endParaRPr lang="en-SG" sz="1100" b="1" dirty="0">
+              <a:solidFill>
+                <a:schemeClr val="accent3">
+                  <a:lumMod val="75000"/>
+                </a:schemeClr>
+              </a:solidFill>
+            </a:endParaRPr>
+          </a:p>
+        </p:txBody>
+      </p:sp>
+      <p:cxnSp>
+        <p:nvCxnSpPr>
+          <p:cNvPr id="61" name="Elbow Connector 60"/>
+          <p:cNvCxnSpPr>
+            <a:stCxn id="51" idx="2"/>
+            <a:endCxn id="56" idx="1"/>
+          </p:cNvCxnSpPr>
+          <p:nvPr/>
+        </p:nvCxnSpPr>
+        <p:spPr>
+          <a:xfrm rot="16200000" flipH="1">
+            <a:off x="1350398" y="3483934"/>
+            <a:ext cx="1446569" cy="205419"/>
+          </a:xfrm>
+          <a:prstGeom prst="bentConnector2">
+            <a:avLst/>
+          </a:prstGeom>
+          <a:ln w="19050">
+            <a:solidFill>
+              <a:schemeClr val="accent3"/>
+            </a:solidFill>
+            <a:headEnd type="none" w="med" len="med"/>
+            <a:tailEnd type="arrow" w="med" len="med"/>
+          </a:ln>
+          <a:effectLst/>
+        </p:spPr>
+        <p:style>
+          <a:lnRef idx="1">
+            <a:schemeClr val="accent2"/>
+          </a:lnRef>
+          <a:fillRef idx="2">
+            <a:schemeClr val="accent2"/>
+          </a:fillRef>
+          <a:effectRef idx="1">
+            <a:schemeClr val="accent2"/>
+          </a:effectRef>
+          <a:fontRef idx="minor">
+            <a:schemeClr val="dk1"/>
+          </a:fontRef>
+        </p:style>
+      </p:cxnSp>
+      <p:cxnSp>
+        <p:nvCxnSpPr>
+          <p:cNvPr id="64" name="Elbow Connector 63"/>
+          <p:cNvCxnSpPr>
+            <a:stCxn id="51" idx="2"/>
+            <a:endCxn id="60" idx="1"/>
+          </p:cNvCxnSpPr>
+          <p:nvPr/>
+        </p:nvCxnSpPr>
+        <p:spPr>
+          <a:xfrm rot="16200000" flipH="1">
+            <a:off x="992822" y="3841510"/>
+            <a:ext cx="2161720" cy="205419"/>
+          </a:xfrm>
+          <a:prstGeom prst="bentConnector2">
+            <a:avLst/>
+          </a:prstGeom>
+          <a:ln w="19050">
+            <a:solidFill>
+              <a:schemeClr val="accent3"/>
+            </a:solidFill>
+            <a:headEnd type="none" w="med" len="med"/>
+            <a:tailEnd type="arrow" w="med" len="med"/>
+          </a:ln>
+          <a:effectLst/>
+        </p:spPr>
+        <p:style>
+          <a:lnRef idx="1">
+            <a:schemeClr val="accent2"/>
+          </a:lnRef>
+          <a:fillRef idx="2">
+            <a:schemeClr val="accent2"/>
+          </a:fillRef>
+          <a:effectRef idx="1">
+            <a:schemeClr val="accent2"/>
+          </a:effectRef>
+          <a:fontRef idx="minor">
+            <a:schemeClr val="dk1"/>
+          </a:fontRef>
+        </p:style>
+      </p:cxnSp>
+      <p:cxnSp>
+        <p:nvCxnSpPr>
+          <p:cNvPr id="67" name="Elbow Connector 66"/>
+          <p:cNvCxnSpPr>
+            <a:stCxn id="51" idx="2"/>
+            <a:endCxn id="58" idx="1"/>
+          </p:cNvCxnSpPr>
+          <p:nvPr/>
+        </p:nvCxnSpPr>
+        <p:spPr>
+          <a:xfrm rot="16200000" flipH="1">
+            <a:off x="635247" y="4199086"/>
+            <a:ext cx="2876871" cy="205418"/>
+          </a:xfrm>
+          <a:prstGeom prst="bentConnector2">
+            <a:avLst/>
+          </a:prstGeom>
+          <a:ln w="19050">
+            <a:solidFill>
+              <a:schemeClr val="accent3"/>
+            </a:solidFill>
+            <a:headEnd type="none" w="med" len="med"/>
+            <a:tailEnd type="arrow" w="med" len="med"/>
+          </a:ln>
+          <a:effectLst/>
+        </p:spPr>
+        <p:style>
+          <a:lnRef idx="1">
+            <a:schemeClr val="accent2"/>
+          </a:lnRef>
+          <a:fillRef idx="2">
+            <a:schemeClr val="accent2"/>
+          </a:fillRef>
+          <a:effectRef idx="1">
+            <a:schemeClr val="accent2"/>
+          </a:effectRef>
+          <a:fontRef idx="minor">
+            <a:schemeClr val="dk1"/>
+          </a:fontRef>
+        </p:style>
+      </p:cxnSp>
+      <p:sp>
+        <p:nvSpPr>
+          <p:cNvPr id="70" name="Rectangle 62"/>
+          <p:cNvSpPr/>
+          <p:nvPr/>
+        </p:nvSpPr>
+        <p:spPr>
+          <a:xfrm>
+            <a:off x="4572000" y="2213270"/>
+            <a:ext cx="1672988" cy="346760"/>
+          </a:xfrm>
+          <a:prstGeom prst="rect">
+            <a:avLst/>
+          </a:prstGeom>
+          <a:ln w="6350">
+            <a:solidFill>
+              <a:schemeClr val="accent3"/>
+            </a:solidFill>
+          </a:ln>
+          <a:effectLst/>
+        </p:spPr>
+        <p:style>
+          <a:lnRef idx="1">
+            <a:schemeClr val="accent3"/>
+          </a:lnRef>
+          <a:fillRef idx="2">
+            <a:schemeClr val="accent3"/>
+          </a:fillRef>
+          <a:effectRef idx="1">
+            <a:schemeClr val="accent3"/>
+          </a:effectRef>
+          <a:fontRef idx="minor">
+            <a:schemeClr val="dk1"/>
+          </a:fontRef>
+        </p:style>
+        <p:txBody>
+          <a:bodyPr rtlCol="0" anchor="ctr"/>
+          <a:lstStyle/>
+          <a:p>
+            <a:pPr algn="ctr"/>
+            <a:r>
+              <a:rPr lang="en-US" sz="1050" b="1" dirty="0">
+                <a:solidFill>
+                  <a:schemeClr val="accent3">
+                    <a:lumMod val="75000"/>
+                  </a:schemeClr>
+                </a:solidFill>
+              </a:rPr>
+              <a:t>{abstract}</a:t>
+            </a:r>
+            <a:br>
+              <a:rPr lang="en-US" sz="1050" b="1" dirty="0">
+                <a:solidFill>
+                  <a:schemeClr val="accent3">
+                    <a:lumMod val="75000"/>
+                  </a:schemeClr>
+                </a:solidFill>
+              </a:rPr>
+            </a:br>
+            <a:r>
+              <a:rPr lang="en-US" sz="1050" b="1" dirty="0" smtClean="0">
+                <a:solidFill>
+                  <a:schemeClr val="accent3">
+                    <a:lumMod val="75000"/>
+                  </a:schemeClr>
+                </a:solidFill>
+              </a:rPr>
+              <a:t>TriviaTestResultPage</a:t>
+            </a:r>
+          </a:p>
+        </p:txBody>
+      </p:sp>
+      <p:sp>
+        <p:nvSpPr>
+          <p:cNvPr id="71" name="Rectangle 62"/>
+          <p:cNvSpPr/>
+          <p:nvPr/>
+        </p:nvSpPr>
+        <p:spPr>
+          <a:xfrm>
+            <a:off x="6400800" y="2213270"/>
+            <a:ext cx="1672988" cy="346760"/>
+          </a:xfrm>
+          <a:prstGeom prst="rect">
+            <a:avLst/>
+          </a:prstGeom>
+          <a:ln w="6350">
+            <a:solidFill>
+              <a:schemeClr val="accent3"/>
+            </a:solidFill>
+          </a:ln>
+          <a:effectLst/>
+        </p:spPr>
+        <p:style>
+          <a:lnRef idx="1">
+            <a:schemeClr val="accent3"/>
+          </a:lnRef>
+          <a:fillRef idx="2">
+            <a:schemeClr val="accent3"/>
+          </a:fillRef>
+          <a:effectRef idx="1">
+            <a:schemeClr val="accent3"/>
+          </a:effectRef>
+          <a:fontRef idx="minor">
+            <a:schemeClr val="dk1"/>
+          </a:fontRef>
+        </p:style>
+        <p:txBody>
+          <a:bodyPr rtlCol="0" anchor="ctr"/>
+          <a:lstStyle/>
+          <a:p>
+            <a:pPr algn="ctr"/>
+            <a:r>
+              <a:rPr lang="en-US" sz="1050" b="1" dirty="0">
+                <a:solidFill>
+                  <a:schemeClr val="accent3">
+                    <a:lumMod val="75000"/>
+                  </a:schemeClr>
+                </a:solidFill>
+              </a:rPr>
+              <a:t>{abstract}</a:t>
+            </a:r>
+            <a:br>
+              <a:rPr lang="en-US" sz="1050" b="1" dirty="0">
+                <a:solidFill>
+                  <a:schemeClr val="accent3">
+                    <a:lumMod val="75000"/>
+                  </a:schemeClr>
+                </a:solidFill>
+              </a:rPr>
+            </a:br>
+            <a:r>
+              <a:rPr lang="en-US" sz="1050" b="1" dirty="0" smtClean="0">
+                <a:solidFill>
+                  <a:schemeClr val="accent3">
+                    <a:lumMod val="75000"/>
+                  </a:schemeClr>
+                </a:solidFill>
+              </a:rPr>
+              <a:t>TriviaTestPage</a:t>
+            </a:r>
+          </a:p>
+        </p:txBody>
+      </p:sp>
+      <p:sp>
+        <p:nvSpPr>
+          <p:cNvPr id="72" name="Isosceles Triangle 102"/>
+          <p:cNvSpPr/>
+          <p:nvPr/>
+        </p:nvSpPr>
+        <p:spPr>
+          <a:xfrm rot="10800000" flipV="1">
+            <a:off x="5273242" y="2567676"/>
+            <a:ext cx="270504" cy="175523"/>
+          </a:xfrm>
+          <a:prstGeom prst="triangle">
+            <a:avLst>
+              <a:gd name="adj" fmla="val 52641"/>
+            </a:avLst>
+          </a:prstGeom>
+          <a:ln w="6350">
+            <a:solidFill>
+              <a:schemeClr val="accent3"/>
+            </a:solidFill>
+          </a:ln>
+          <a:effectLst/>
+        </p:spPr>
+        <p:style>
+          <a:lnRef idx="1">
+            <a:schemeClr val="accent3"/>
+          </a:lnRef>
+          <a:fillRef idx="2">
+            <a:schemeClr val="accent3"/>
+          </a:fillRef>
+          <a:effectRef idx="1">
+            <a:schemeClr val="accent3"/>
+          </a:effectRef>
+          <a:fontRef idx="minor">
+            <a:schemeClr val="dk1"/>
+          </a:fontRef>
+        </p:style>
+        <p:txBody>
+          <a:bodyPr rtlCol="0" anchor="ctr"/>
+          <a:lstStyle/>
+          <a:p>
+            <a:pPr algn="ctr"/>
+            <a:endParaRPr lang="en-SG" sz="1050" b="1">
+              <a:solidFill>
+                <a:srgbClr val="92D050"/>
+              </a:solidFill>
+            </a:endParaRPr>
+          </a:p>
+        </p:txBody>
+      </p:sp>
+      <p:sp>
+        <p:nvSpPr>
+          <p:cNvPr id="73" name="Isosceles Triangle 102"/>
+          <p:cNvSpPr/>
+          <p:nvPr/>
+        </p:nvSpPr>
+        <p:spPr>
+          <a:xfrm rot="10800000" flipV="1">
+            <a:off x="7102042" y="2560030"/>
+            <a:ext cx="270504" cy="175523"/>
+          </a:xfrm>
+          <a:prstGeom prst="triangle">
+            <a:avLst>
+              <a:gd name="adj" fmla="val 52641"/>
+            </a:avLst>
+          </a:prstGeom>
+          <a:ln w="6350">
+            <a:solidFill>
+              <a:schemeClr val="accent3"/>
+            </a:solidFill>
+          </a:ln>
+          <a:effectLst/>
+        </p:spPr>
+        <p:style>
+          <a:lnRef idx="1">
+            <a:schemeClr val="accent3"/>
+          </a:lnRef>
+          <a:fillRef idx="2">
+            <a:schemeClr val="accent3"/>
+          </a:fillRef>
+          <a:effectRef idx="1">
+            <a:schemeClr val="accent3"/>
+          </a:effectRef>
+          <a:fontRef idx="minor">
+            <a:schemeClr val="dk1"/>
+          </a:fontRef>
+        </p:style>
+        <p:txBody>
+          <a:bodyPr rtlCol="0" anchor="ctr"/>
+          <a:lstStyle/>
+          <a:p>
+            <a:pPr algn="ctr"/>
+            <a:endParaRPr lang="en-SG" sz="1050" b="1">
+              <a:solidFill>
+                <a:srgbClr val="92D050"/>
+              </a:solidFill>
+            </a:endParaRPr>
+          </a:p>
+        </p:txBody>
+      </p:sp>
+      <p:cxnSp>
+        <p:nvCxnSpPr>
+          <p:cNvPr id="74" name="Elbow Connector 63"/>
+          <p:cNvCxnSpPr>
+            <a:stCxn id="53" idx="3"/>
+            <a:endCxn id="72" idx="3"/>
+          </p:cNvCxnSpPr>
+          <p:nvPr/>
+        </p:nvCxnSpPr>
+        <p:spPr>
+          <a:xfrm flipV="1">
+            <a:off x="3962400" y="2743199"/>
+            <a:ext cx="1438950" cy="1062681"/>
+          </a:xfrm>
+          <a:prstGeom prst="bentConnector2">
+            <a:avLst/>
+          </a:prstGeom>
+          <a:ln w="6350">
+            <a:solidFill>
+              <a:schemeClr val="accent3"/>
+            </a:solidFill>
+            <a:headEnd type="none" w="med" len="med"/>
+            <a:tailEnd type="none" w="med" len="med"/>
+          </a:ln>
+          <a:effectLst/>
+        </p:spPr>
+        <p:style>
+          <a:lnRef idx="1">
+            <a:schemeClr val="accent2"/>
+          </a:lnRef>
+          <a:fillRef idx="2">
+            <a:schemeClr val="accent2"/>
+          </a:fillRef>
+          <a:effectRef idx="1">
+            <a:schemeClr val="accent2"/>
+          </a:effectRef>
+          <a:fontRef idx="minor">
+            <a:schemeClr val="dk1"/>
+          </a:fontRef>
+        </p:style>
+      </p:cxnSp>
+      <p:cxnSp>
+        <p:nvCxnSpPr>
+          <p:cNvPr id="81" name="Elbow Connector 63"/>
+          <p:cNvCxnSpPr>
+            <a:stCxn id="60" idx="3"/>
+            <a:endCxn id="73" idx="3"/>
+          </p:cNvCxnSpPr>
+          <p:nvPr/>
+        </p:nvCxnSpPr>
+        <p:spPr>
+          <a:xfrm flipV="1">
+            <a:off x="3962399" y="2735553"/>
+            <a:ext cx="3267751" cy="2289527"/>
+          </a:xfrm>
+          <a:prstGeom prst="bentConnector2">
+            <a:avLst/>
+          </a:prstGeom>
+          <a:ln w="6350">
+            <a:solidFill>
+              <a:schemeClr val="accent3"/>
+            </a:solidFill>
+            <a:headEnd type="none" w="med" len="med"/>
+            <a:tailEnd type="none" w="med" len="med"/>
+          </a:ln>
+          <a:effectLst/>
+        </p:spPr>
+        <p:style>
+          <a:lnRef idx="1">
+            <a:schemeClr val="accent2"/>
+          </a:lnRef>
+          <a:fillRef idx="2">
+            <a:schemeClr val="accent2"/>
+          </a:fillRef>
+          <a:effectRef idx="1">
+            <a:schemeClr val="accent2"/>
+          </a:effectRef>
+          <a:fontRef idx="minor">
+            <a:schemeClr val="dk1"/>
+          </a:fontRef>
+        </p:style>
+      </p:cxnSp>
+      <p:cxnSp>
+        <p:nvCxnSpPr>
+          <p:cNvPr id="84" name="Elbow Connector 63"/>
+          <p:cNvCxnSpPr>
+            <a:stCxn id="56" idx="3"/>
+            <a:endCxn id="72" idx="3"/>
+          </p:cNvCxnSpPr>
+          <p:nvPr/>
+        </p:nvCxnSpPr>
+        <p:spPr>
+          <a:xfrm flipV="1">
+            <a:off x="3962400" y="2743199"/>
+            <a:ext cx="1438950" cy="1566730"/>
+          </a:xfrm>
+          <a:prstGeom prst="bentConnector2">
+            <a:avLst/>
+          </a:prstGeom>
+          <a:ln w="6350">
+            <a:solidFill>
+              <a:schemeClr val="accent3"/>
+            </a:solidFill>
+            <a:headEnd type="none" w="med" len="med"/>
+            <a:tailEnd type="none" w="med" len="med"/>
+          </a:ln>
+          <a:effectLst/>
+        </p:spPr>
+        <p:style>
+          <a:lnRef idx="1">
+            <a:schemeClr val="accent2"/>
+          </a:lnRef>
+          <a:fillRef idx="2">
+            <a:schemeClr val="accent2"/>
+          </a:fillRef>
+          <a:effectRef idx="1">
+            <a:schemeClr val="accent2"/>
+          </a:effectRef>
+          <a:fontRef idx="minor">
+            <a:schemeClr val="dk1"/>
+          </a:fontRef>
+        </p:style>
+      </p:cxnSp>
+      <p:cxnSp>
+        <p:nvCxnSpPr>
+          <p:cNvPr id="87" name="Elbow Connector 63"/>
+          <p:cNvCxnSpPr>
+            <a:stCxn id="58" idx="3"/>
+            <a:endCxn id="73" idx="3"/>
+          </p:cNvCxnSpPr>
+          <p:nvPr/>
+        </p:nvCxnSpPr>
+        <p:spPr>
+          <a:xfrm flipV="1">
+            <a:off x="3962399" y="2735553"/>
+            <a:ext cx="3267751" cy="3004678"/>
+          </a:xfrm>
+          <a:prstGeom prst="bentConnector2">
+            <a:avLst/>
+          </a:prstGeom>
+          <a:ln w="6350">
+            <a:solidFill>
+              <a:schemeClr val="accent3"/>
+            </a:solidFill>
+            <a:headEnd type="none" w="med" len="med"/>
+            <a:tailEnd type="none" w="med" len="med"/>
+          </a:ln>
+          <a:effectLst/>
+        </p:spPr>
+        <p:style>
+          <a:lnRef idx="1">
+            <a:schemeClr val="accent2"/>
+          </a:lnRef>
+          <a:fillRef idx="2">
+            <a:schemeClr val="accent2"/>
+          </a:fillRef>
+          <a:effectRef idx="1">
+            <a:schemeClr val="accent2"/>
+          </a:effectRef>
+          <a:fontRef idx="minor">
+            <a:schemeClr val="dk1"/>
+          </a:fontRef>
+        </p:style>
+      </p:cxnSp>
+    </p:spTree>
+    <p:extLst>
+      <p:ext uri="{BB962C8B-B14F-4D97-AF65-F5344CB8AC3E}">
+        <p14:creationId xmlns:p14="http://schemas.microsoft.com/office/powerpoint/2010/main" val="1713293210"/>
       </p:ext>
     </p:extLst>
   </p:cSld>

</xml_diff>